<commit_message>
Module 7 changes complete, Links complete. (lab6 needs work)
</commit_message>
<xml_diff>
--- a/Complimentary Course Content/Module7/Lessons/Module7_Lesson4 Launching A Web server With Chef.pptx
+++ b/Complimentary Course Content/Module7/Lessons/Module7_Lesson4 Launching A Web server With Chef.pptx
@@ -150,7 +150,7 @@
   </p:defaultTextStyle>
   <p:extLst>
     <p:ext uri="{EFAFB233-063F-42B5-8137-9DF3F51BA10A}">
-      <p15:sldGuideLst xmlns="" xmlns:p15="http://schemas.microsoft.com/office/powerpoint/2012/main">
+      <p15:sldGuideLst xmlns:p15="http://schemas.microsoft.com/office/powerpoint/2012/main" xmlns="">
         <p15:guide id="1" orient="horz" pos="2184" userDrawn="1">
           <p15:clr>
             <a:srgbClr val="A4A3A4"/>
@@ -271,7 +271,7 @@
             <a:fld id="{49B60EF2-7028-489F-85D8-FE86CD7CF2A0}" type="datetimeFigureOut">
               <a:rPr lang="en-US" smtClean="0"/>
               <a:pPr/>
-              <a:t>6/30/16</a:t>
+              <a:t>7/11/16</a:t>
             </a:fld>
             <a:endParaRPr lang="en-US"/>
           </a:p>
@@ -6310,6 +6310,62 @@
           <a:bodyPr/>
           <a:lstStyle/>
           <a:p>
+            <a:pPr marL="0" indent="0">
+              <a:buFont typeface="Arial"/>
+              <a:buNone/>
+            </a:pPr>
+            <a:r>
+              <a:rPr lang="en-US" b="1" smtClean="0"/>
+              <a:t>Notes:</a:t>
+            </a:r>
+          </a:p>
+          <a:p>
+            <a:pPr marL="171450" indent="-171450">
+              <a:buFont typeface="Arial"/>
+              <a:buChar char="•"/>
+            </a:pPr>
+            <a:r>
+              <a:rPr lang="en-US" dirty="0" smtClean="0"/>
+              <a:t>The</a:t>
+            </a:r>
+            <a:r>
+              <a:rPr lang="en-US" baseline="0" dirty="0" smtClean="0"/>
+              <a:t> Module 7 Lesson 4 Lab should be completed at this time</a:t>
+            </a:r>
+          </a:p>
+          <a:p>
+            <a:pPr marL="628650" lvl="1" indent="-171450">
+              <a:buFont typeface="Arial"/>
+              <a:buChar char="•"/>
+            </a:pPr>
+            <a:r>
+              <a:rPr lang="en-US" dirty="0" smtClean="0"/>
+              <a:t>https://</a:t>
+            </a:r>
+            <a:r>
+              <a:rPr lang="en-US" dirty="0" err="1" smtClean="0"/>
+              <a:t>github.com</a:t>
+            </a:r>
+            <a:r>
+              <a:rPr lang="en-US" dirty="0" smtClean="0"/>
+              <a:t>/</a:t>
+            </a:r>
+            <a:r>
+              <a:rPr lang="en-US" dirty="0" err="1" smtClean="0"/>
+              <a:t>MSFTImagine</a:t>
+            </a:r>
+            <a:r>
+              <a:rPr lang="en-US" dirty="0" smtClean="0"/>
+              <a:t>/</a:t>
+            </a:r>
+            <a:r>
+              <a:rPr lang="en-US" dirty="0" err="1" smtClean="0"/>
+              <a:t>computerscience</a:t>
+            </a:r>
+            <a:r>
+              <a:rPr lang="en-US" dirty="0" smtClean="0"/>
+              <a:t>/tree/master/Complimentary%20Course%20Content/Module7/Labs</a:t>
+            </a:r>
             <a:endParaRPr lang="en-US" dirty="0"/>
           </a:p>
         </p:txBody>
@@ -7306,7 +7362,7 @@
             <a:fld id="{0459C166-16D3-4A25-A2F8-C51E0E346B22}" type="datetimeFigureOut">
               <a:rPr lang="en-US" smtClean="0"/>
               <a:pPr/>
-              <a:t>6/30/16</a:t>
+              <a:t>7/11/16</a:t>
             </a:fld>
             <a:endParaRPr lang="en-US"/>
           </a:p>
@@ -7476,7 +7532,7 @@
             <a:fld id="{0459C166-16D3-4A25-A2F8-C51E0E346B22}" type="datetimeFigureOut">
               <a:rPr lang="en-US" smtClean="0"/>
               <a:pPr/>
-              <a:t>6/30/16</a:t>
+              <a:t>7/11/16</a:t>
             </a:fld>
             <a:endParaRPr lang="en-US"/>
           </a:p>
@@ -7656,7 +7712,7 @@
             <a:fld id="{0459C166-16D3-4A25-A2F8-C51E0E346B22}" type="datetimeFigureOut">
               <a:rPr lang="en-US" smtClean="0"/>
               <a:pPr/>
-              <a:t>6/30/16</a:t>
+              <a:t>7/11/16</a:t>
             </a:fld>
             <a:endParaRPr lang="en-US"/>
           </a:p>
@@ -7873,7 +7929,7 @@
                 <a:latin typeface="Segoe UI"/>
               </a:rPr>
               <a:pPr/>
-              <a:t>6/30/16</a:t>
+              <a:t>7/11/16</a:t>
             </a:fld>
             <a:endParaRPr lang="en-US">
               <a:solidFill>
@@ -8078,7 +8134,7 @@
                 <a:latin typeface="Segoe UI"/>
               </a:rPr>
               <a:pPr/>
-              <a:t>6/30/16</a:t>
+              <a:t>7/11/16</a:t>
             </a:fld>
             <a:endParaRPr lang="en-US">
               <a:solidFill>
@@ -8376,7 +8432,7 @@
                 <a:latin typeface="Segoe UI"/>
               </a:rPr>
               <a:pPr/>
-              <a:t>6/30/16</a:t>
+              <a:t>7/11/16</a:t>
             </a:fld>
             <a:endParaRPr lang="en-US">
               <a:solidFill>
@@ -8720,7 +8776,7 @@
                 <a:latin typeface="Segoe UI"/>
               </a:rPr>
               <a:pPr/>
-              <a:t>6/30/16</a:t>
+              <a:t>7/11/16</a:t>
             </a:fld>
             <a:endParaRPr lang="en-US">
               <a:solidFill>
@@ -9095,7 +9151,7 @@
                 <a:latin typeface="Segoe UI"/>
               </a:rPr>
               <a:pPr/>
-              <a:t>6/30/16</a:t>
+              <a:t>7/11/16</a:t>
             </a:fld>
             <a:endParaRPr lang="en-US">
               <a:solidFill>
@@ -9971,7 +10027,7 @@
             <a:fld id="{0459C166-16D3-4A25-A2F8-C51E0E346B22}" type="datetimeFigureOut">
               <a:rPr lang="en-US" smtClean="0"/>
               <a:pPr/>
-              <a:t>6/30/16</a:t>
+              <a:t>7/11/16</a:t>
             </a:fld>
             <a:endParaRPr lang="en-US"/>
           </a:p>
@@ -10209,7 +10265,7 @@
                 <a:latin typeface="Segoe UI"/>
               </a:rPr>
               <a:pPr/>
-              <a:t>6/30/16</a:t>
+              <a:t>7/11/16</a:t>
             </a:fld>
             <a:endParaRPr lang="en-US">
               <a:solidFill>
@@ -10610,7 +10666,7 @@
                 <a:latin typeface="Segoe UI"/>
               </a:rPr>
               <a:pPr/>
-              <a:t>6/30/16</a:t>
+              <a:t>7/11/16</a:t>
             </a:fld>
             <a:endParaRPr lang="en-US">
               <a:solidFill>
@@ -10764,7 +10820,7 @@
                 <a:latin typeface="Segoe UI"/>
               </a:rPr>
               <a:pPr/>
-              <a:t>6/30/16</a:t>
+              <a:t>7/11/16</a:t>
             </a:fld>
             <a:endParaRPr lang="en-US">
               <a:solidFill>
@@ -10896,7 +10952,7 @@
                 <a:latin typeface="Segoe UI"/>
               </a:rPr>
               <a:pPr/>
-              <a:t>6/30/16</a:t>
+              <a:t>7/11/16</a:t>
             </a:fld>
             <a:endParaRPr lang="en-US">
               <a:solidFill>
@@ -11208,7 +11264,7 @@
                 <a:latin typeface="Segoe UI"/>
               </a:rPr>
               <a:pPr/>
-              <a:t>6/30/16</a:t>
+              <a:t>7/11/16</a:t>
             </a:fld>
             <a:endParaRPr lang="en-US">
               <a:solidFill>
@@ -11497,7 +11553,7 @@
                 <a:latin typeface="Segoe UI"/>
               </a:rPr>
               <a:pPr/>
-              <a:t>6/30/16</a:t>
+              <a:t>7/11/16</a:t>
             </a:fld>
             <a:endParaRPr lang="en-US">
               <a:solidFill>
@@ -11702,7 +11758,7 @@
                 <a:latin typeface="Segoe UI"/>
               </a:rPr>
               <a:pPr/>
-              <a:t>6/30/16</a:t>
+              <a:t>7/11/16</a:t>
             </a:fld>
             <a:endParaRPr lang="en-US">
               <a:solidFill>
@@ -11917,7 +11973,7 @@
                 <a:latin typeface="Segoe UI"/>
               </a:rPr>
               <a:pPr/>
-              <a:t>6/30/16</a:t>
+              <a:t>7/11/16</a:t>
             </a:fld>
             <a:endParaRPr lang="en-US">
               <a:solidFill>
@@ -12212,7 +12268,7 @@
             <a:fld id="{0459C166-16D3-4A25-A2F8-C51E0E346B22}" type="datetimeFigureOut">
               <a:rPr lang="en-US" smtClean="0"/>
               <a:pPr/>
-              <a:t>6/30/16</a:t>
+              <a:t>7/11/16</a:t>
             </a:fld>
             <a:endParaRPr lang="en-US"/>
           </a:p>
@@ -12459,7 +12515,7 @@
             <a:fld id="{0459C166-16D3-4A25-A2F8-C51E0E346B22}" type="datetimeFigureOut">
               <a:rPr lang="en-US" smtClean="0"/>
               <a:pPr/>
-              <a:t>6/30/16</a:t>
+              <a:t>7/11/16</a:t>
             </a:fld>
             <a:endParaRPr lang="en-US"/>
           </a:p>
@@ -12825,7 +12881,7 @@
             <a:fld id="{0459C166-16D3-4A25-A2F8-C51E0E346B22}" type="datetimeFigureOut">
               <a:rPr lang="en-US" smtClean="0"/>
               <a:pPr/>
-              <a:t>6/30/16</a:t>
+              <a:t>7/11/16</a:t>
             </a:fld>
             <a:endParaRPr lang="en-US"/>
           </a:p>
@@ -12944,7 +13000,7 @@
             <a:fld id="{0459C166-16D3-4A25-A2F8-C51E0E346B22}" type="datetimeFigureOut">
               <a:rPr lang="en-US" smtClean="0"/>
               <a:pPr/>
-              <a:t>6/30/16</a:t>
+              <a:t>7/11/16</a:t>
             </a:fld>
             <a:endParaRPr lang="en-US"/>
           </a:p>
@@ -13041,7 +13097,7 @@
             <a:fld id="{0459C166-16D3-4A25-A2F8-C51E0E346B22}" type="datetimeFigureOut">
               <a:rPr lang="en-US" smtClean="0"/>
               <a:pPr/>
-              <a:t>6/30/16</a:t>
+              <a:t>7/11/16</a:t>
             </a:fld>
             <a:endParaRPr lang="en-US"/>
           </a:p>
@@ -13318,7 +13374,7 @@
             <a:fld id="{0459C166-16D3-4A25-A2F8-C51E0E346B22}" type="datetimeFigureOut">
               <a:rPr lang="en-US" smtClean="0"/>
               <a:pPr/>
-              <a:t>6/30/16</a:t>
+              <a:t>7/11/16</a:t>
             </a:fld>
             <a:endParaRPr lang="en-US"/>
           </a:p>
@@ -13572,7 +13628,7 @@
             <a:fld id="{0459C166-16D3-4A25-A2F8-C51E0E346B22}" type="datetimeFigureOut">
               <a:rPr lang="en-US" smtClean="0"/>
               <a:pPr/>
-              <a:t>6/30/16</a:t>
+              <a:t>7/11/16</a:t>
             </a:fld>
             <a:endParaRPr lang="en-US"/>
           </a:p>
@@ -13785,7 +13841,7 @@
             <a:fld id="{0459C166-16D3-4A25-A2F8-C51E0E346B22}" type="datetimeFigureOut">
               <a:rPr lang="en-US" smtClean="0"/>
               <a:pPr/>
-              <a:t>6/30/16</a:t>
+              <a:t>7/11/16</a:t>
             </a:fld>
             <a:endParaRPr lang="en-US"/>
           </a:p>
@@ -14332,7 +14388,7 @@
                 <a:latin typeface="Segoe UI"/>
               </a:rPr>
               <a:pPr/>
-              <a:t>6/30/16</a:t>
+              <a:t>7/11/16</a:t>
             </a:fld>
             <a:endParaRPr lang="en-US">
               <a:solidFill>
@@ -34930,7 +34986,7 @@
   <a:extraClrSchemeLst/>
   <a:extLst>
     <a:ext uri="{05A4C25C-085E-4340-85A3-A5531E510DB2}">
-      <thm15:themeFamily xmlns="" xmlns:thm15="http://schemas.microsoft.com/office/thememl/2012/main" name="Office Theme" id="{62F939B6-93AF-4DB8-9C6B-D6C7DFDC589F}" vid="{4A3C46E8-61CC-4603-A589-7422A47A8E4A}"/>
+      <thm15:themeFamily xmlns:thm15="http://schemas.microsoft.com/office/thememl/2012/main" xmlns="" name="Office Theme" id="{62F939B6-93AF-4DB8-9C6B-D6C7DFDC589F}" vid="{4A3C46E8-61CC-4603-A589-7422A47A8E4A}"/>
     </a:ext>
   </a:extLst>
 </a:theme>
@@ -35199,7 +35255,7 @@
   <a:extraClrSchemeLst/>
   <a:extLst>
     <a:ext uri="{05A4C25C-085E-4340-85A3-A5531E510DB2}">
-      <thm15:themeFamily xmlns="" xmlns:thm15="http://schemas.microsoft.com/office/thememl/2012/main" name="Office Theme" id="{62F939B6-93AF-4DB8-9C6B-D6C7DFDC589F}" vid="{4A3C46E8-61CC-4603-A589-7422A47A8E4A}"/>
+      <thm15:themeFamily xmlns:thm15="http://schemas.microsoft.com/office/thememl/2012/main" xmlns="" name="Office Theme" id="{62F939B6-93AF-4DB8-9C6B-D6C7DFDC589F}" vid="{4A3C46E8-61CC-4603-A589-7422A47A8E4A}"/>
     </a:ext>
   </a:extLst>
 </a:theme>
@@ -35494,7 +35550,7 @@
   <a:extraClrSchemeLst/>
   <a:extLst>
     <a:ext uri="{05A4C25C-085E-4340-85A3-A5531E510DB2}">
-      <thm15:themeFamily xmlns="" xmlns:thm15="http://schemas.microsoft.com/office/thememl/2012/main" name="Office Theme" id="{62F939B6-93AF-4DB8-9C6B-D6C7DFDC589F}" vid="{4A3C46E8-61CC-4603-A589-7422A47A8E4A}"/>
+      <thm15:themeFamily xmlns:thm15="http://schemas.microsoft.com/office/thememl/2012/main" xmlns="" name="Office Theme" id="{62F939B6-93AF-4DB8-9C6B-D6C7DFDC589F}" vid="{4A3C46E8-61CC-4603-A589-7422A47A8E4A}"/>
     </a:ext>
   </a:extLst>
 </a:theme>

</xml_diff>